<commit_message>
Add plots for Scan, Sort with OpenCL
</commit_message>
<xml_diff>
--- a/reduce/plots/Plots.pptx
+++ b/reduce/plots/Plots.pptx
@@ -673,11 +673,11 @@
           <c:showPercent val="0"/>
           <c:showBubbleSize val="0"/>
         </c:dLbls>
-        <c:axId val="75123712"/>
-        <c:axId val="75125888"/>
+        <c:axId val="71506944"/>
+        <c:axId val="75220096"/>
       </c:scatterChart>
       <c:valAx>
-        <c:axId val="75123712"/>
+        <c:axId val="71506944"/>
         <c:scaling>
           <c:orientation val="minMax"/>
           <c:max val="25"/>
@@ -713,13 +713,13 @@
         <c:majorTickMark val="out"/>
         <c:minorTickMark val="none"/>
         <c:tickLblPos val="nextTo"/>
-        <c:crossAx val="75125888"/>
+        <c:crossAx val="75220096"/>
         <c:crosses val="autoZero"/>
         <c:crossBetween val="midCat"/>
         <c:majorUnit val="1"/>
       </c:valAx>
       <c:valAx>
-        <c:axId val="75125888"/>
+        <c:axId val="75220096"/>
         <c:scaling>
           <c:orientation val="minMax"/>
         </c:scaling>
@@ -749,7 +749,7 @@
         <c:majorTickMark val="out"/>
         <c:minorTickMark val="none"/>
         <c:tickLblPos val="nextTo"/>
-        <c:crossAx val="75123712"/>
+        <c:crossAx val="71506944"/>
         <c:crosses val="autoZero"/>
         <c:crossBetween val="midCat"/>
         <c:majorUnit val="5"/>
@@ -1328,11 +1328,11 @@
           <c:showPercent val="0"/>
           <c:showBubbleSize val="0"/>
         </c:dLbls>
-        <c:axId val="35817728"/>
-        <c:axId val="35873152"/>
+        <c:axId val="30308224"/>
+        <c:axId val="30310400"/>
       </c:scatterChart>
       <c:valAx>
-        <c:axId val="35817728"/>
+        <c:axId val="30308224"/>
         <c:scaling>
           <c:orientation val="minMax"/>
           <c:max val="25"/>
@@ -1368,13 +1368,13 @@
         <c:majorTickMark val="out"/>
         <c:minorTickMark val="none"/>
         <c:tickLblPos val="nextTo"/>
-        <c:crossAx val="35873152"/>
+        <c:crossAx val="30310400"/>
         <c:crosses val="autoZero"/>
         <c:crossBetween val="midCat"/>
         <c:majorUnit val="1"/>
       </c:valAx>
       <c:valAx>
-        <c:axId val="35873152"/>
+        <c:axId val="30310400"/>
         <c:scaling>
           <c:orientation val="minMax"/>
           <c:max val="6"/>
@@ -1405,7 +1405,7 @@
         <c:majorTickMark val="out"/>
         <c:minorTickMark val="none"/>
         <c:tickLblPos val="nextTo"/>
-        <c:crossAx val="35817728"/>
+        <c:crossAx val="30308224"/>
         <c:crosses val="autoZero"/>
         <c:crossBetween val="midCat"/>
         <c:majorUnit val="1"/>
@@ -2104,11 +2104,11 @@
           <c:showPercent val="0"/>
           <c:showBubbleSize val="0"/>
         </c:dLbls>
-        <c:axId val="35251712"/>
-        <c:axId val="35275136"/>
+        <c:axId val="30228480"/>
+        <c:axId val="30230400"/>
       </c:scatterChart>
       <c:valAx>
-        <c:axId val="35251712"/>
+        <c:axId val="30228480"/>
         <c:scaling>
           <c:orientation val="minMax"/>
           <c:max val="25"/>
@@ -2144,13 +2144,13 @@
         <c:majorTickMark val="out"/>
         <c:minorTickMark val="none"/>
         <c:tickLblPos val="nextTo"/>
-        <c:crossAx val="35275136"/>
+        <c:crossAx val="30230400"/>
         <c:crosses val="autoZero"/>
         <c:crossBetween val="midCat"/>
         <c:majorUnit val="1"/>
       </c:valAx>
       <c:valAx>
-        <c:axId val="35275136"/>
+        <c:axId val="30230400"/>
         <c:scaling>
           <c:orientation val="minMax"/>
         </c:scaling>
@@ -2180,7 +2180,7 @@
         <c:majorTickMark val="out"/>
         <c:minorTickMark val="none"/>
         <c:tickLblPos val="nextTo"/>
-        <c:crossAx val="35251712"/>
+        <c:crossAx val="30228480"/>
         <c:crosses val="autoZero"/>
         <c:crossBetween val="midCat"/>
         <c:majorUnit val="5"/>
@@ -2749,11 +2749,11 @@
           <c:showPercent val="0"/>
           <c:showBubbleSize val="0"/>
         </c:dLbls>
-        <c:axId val="35469568"/>
-        <c:axId val="35485568"/>
+        <c:axId val="30434432"/>
+        <c:axId val="30436352"/>
       </c:scatterChart>
       <c:valAx>
-        <c:axId val="35469568"/>
+        <c:axId val="30434432"/>
         <c:scaling>
           <c:orientation val="minMax"/>
           <c:max val="25"/>
@@ -2789,13 +2789,13 @@
         <c:majorTickMark val="out"/>
         <c:minorTickMark val="none"/>
         <c:tickLblPos val="nextTo"/>
-        <c:crossAx val="35485568"/>
+        <c:crossAx val="30436352"/>
         <c:crosses val="autoZero"/>
         <c:crossBetween val="midCat"/>
         <c:majorUnit val="1"/>
       </c:valAx>
       <c:valAx>
-        <c:axId val="35485568"/>
+        <c:axId val="30436352"/>
         <c:scaling>
           <c:orientation val="minMax"/>
           <c:max val="65"/>
@@ -2827,7 +2827,7 @@
         <c:majorTickMark val="out"/>
         <c:minorTickMark val="none"/>
         <c:tickLblPos val="nextTo"/>
-        <c:crossAx val="35469568"/>
+        <c:crossAx val="30434432"/>
         <c:crosses val="autoZero"/>
         <c:crossBetween val="midCat"/>
         <c:majorUnit val="5"/>
@@ -3396,11 +3396,11 @@
           <c:showPercent val="0"/>
           <c:showBubbleSize val="0"/>
         </c:dLbls>
-        <c:axId val="35761152"/>
-        <c:axId val="36034048"/>
+        <c:axId val="32344320"/>
+        <c:axId val="32354688"/>
       </c:scatterChart>
       <c:valAx>
-        <c:axId val="35761152"/>
+        <c:axId val="32344320"/>
         <c:scaling>
           <c:orientation val="minMax"/>
           <c:max val="25"/>
@@ -3436,13 +3436,13 @@
         <c:majorTickMark val="out"/>
         <c:minorTickMark val="none"/>
         <c:tickLblPos val="nextTo"/>
-        <c:crossAx val="36034048"/>
+        <c:crossAx val="32354688"/>
         <c:crosses val="autoZero"/>
         <c:crossBetween val="midCat"/>
         <c:majorUnit val="1"/>
       </c:valAx>
       <c:valAx>
-        <c:axId val="36034048"/>
+        <c:axId val="32354688"/>
         <c:scaling>
           <c:orientation val="minMax"/>
           <c:max val="40"/>
@@ -3474,7 +3474,7 @@
         <c:majorTickMark val="out"/>
         <c:minorTickMark val="none"/>
         <c:tickLblPos val="nextTo"/>
-        <c:crossAx val="35761152"/>
+        <c:crossAx val="32344320"/>
         <c:crosses val="autoZero"/>
         <c:crossBetween val="midCat"/>
         <c:majorUnit val="2"/>
@@ -3913,11 +3913,11 @@
           <c:showPercent val="0"/>
           <c:showBubbleSize val="0"/>
         </c:dLbls>
-        <c:axId val="70487424"/>
-        <c:axId val="31196672"/>
+        <c:axId val="31214208"/>
+        <c:axId val="31216384"/>
       </c:scatterChart>
       <c:valAx>
-        <c:axId val="70487424"/>
+        <c:axId val="31214208"/>
         <c:scaling>
           <c:orientation val="minMax"/>
           <c:max val="25"/>
@@ -3953,13 +3953,13 @@
         <c:majorTickMark val="out"/>
         <c:minorTickMark val="none"/>
         <c:tickLblPos val="nextTo"/>
-        <c:crossAx val="31196672"/>
+        <c:crossAx val="31216384"/>
         <c:crosses val="autoZero"/>
         <c:crossBetween val="midCat"/>
         <c:majorUnit val="1"/>
       </c:valAx>
       <c:valAx>
-        <c:axId val="31196672"/>
+        <c:axId val="31216384"/>
         <c:scaling>
           <c:orientation val="minMax"/>
           <c:max val="60"/>
@@ -3991,7 +3991,7 @@
         <c:majorTickMark val="out"/>
         <c:minorTickMark val="none"/>
         <c:tickLblPos val="nextTo"/>
-        <c:crossAx val="70487424"/>
+        <c:crossAx val="31214208"/>
         <c:crosses val="autoZero"/>
         <c:crossBetween val="midCat"/>
         <c:majorUnit val="5"/>
@@ -4570,11 +4570,11 @@
           <c:showPercent val="0"/>
           <c:showBubbleSize val="0"/>
         </c:dLbls>
-        <c:axId val="31303552"/>
-        <c:axId val="31305728"/>
+        <c:axId val="31326208"/>
+        <c:axId val="31328128"/>
       </c:scatterChart>
       <c:valAx>
-        <c:axId val="31303552"/>
+        <c:axId val="31326208"/>
         <c:scaling>
           <c:orientation val="minMax"/>
           <c:max val="25"/>
@@ -4610,13 +4610,13 @@
         <c:majorTickMark val="out"/>
         <c:minorTickMark val="none"/>
         <c:tickLblPos val="nextTo"/>
-        <c:crossAx val="31305728"/>
+        <c:crossAx val="31328128"/>
         <c:crosses val="autoZero"/>
         <c:crossBetween val="midCat"/>
         <c:majorUnit val="1"/>
       </c:valAx>
       <c:valAx>
-        <c:axId val="31305728"/>
+        <c:axId val="31328128"/>
         <c:scaling>
           <c:orientation val="minMax"/>
         </c:scaling>
@@ -4646,7 +4646,7 @@
         <c:majorTickMark val="out"/>
         <c:minorTickMark val="none"/>
         <c:tickLblPos val="nextTo"/>
-        <c:crossAx val="31303552"/>
+        <c:crossAx val="31326208"/>
         <c:crosses val="autoZero"/>
         <c:crossBetween val="midCat"/>
         <c:majorUnit val="5"/>
@@ -5355,11 +5355,11 @@
           <c:showPercent val="0"/>
           <c:showBubbleSize val="0"/>
         </c:dLbls>
-        <c:axId val="31993856"/>
-        <c:axId val="31995776"/>
+        <c:axId val="31762304"/>
+        <c:axId val="31768576"/>
       </c:scatterChart>
       <c:valAx>
-        <c:axId val="31993856"/>
+        <c:axId val="31762304"/>
         <c:scaling>
           <c:orientation val="minMax"/>
           <c:max val="25"/>
@@ -5395,13 +5395,13 @@
         <c:majorTickMark val="out"/>
         <c:minorTickMark val="none"/>
         <c:tickLblPos val="nextTo"/>
-        <c:crossAx val="31995776"/>
+        <c:crossAx val="31768576"/>
         <c:crosses val="autoZero"/>
         <c:crossBetween val="midCat"/>
         <c:majorUnit val="1"/>
       </c:valAx>
       <c:valAx>
-        <c:axId val="31995776"/>
+        <c:axId val="31768576"/>
         <c:scaling>
           <c:orientation val="minMax"/>
         </c:scaling>
@@ -5431,7 +5431,7 @@
         <c:majorTickMark val="out"/>
         <c:minorTickMark val="none"/>
         <c:tickLblPos val="nextTo"/>
-        <c:crossAx val="31993856"/>
+        <c:crossAx val="31762304"/>
         <c:crosses val="autoZero"/>
         <c:crossBetween val="midCat"/>
         <c:majorUnit val="8"/>
@@ -6010,11 +6010,11 @@
           <c:showPercent val="0"/>
           <c:showBubbleSize val="0"/>
         </c:dLbls>
-        <c:axId val="32121984"/>
-        <c:axId val="32123904"/>
+        <c:axId val="31591424"/>
+        <c:axId val="31593600"/>
       </c:scatterChart>
       <c:valAx>
-        <c:axId val="32121984"/>
+        <c:axId val="31591424"/>
         <c:scaling>
           <c:orientation val="minMax"/>
           <c:max val="25"/>
@@ -6050,13 +6050,13 @@
         <c:majorTickMark val="out"/>
         <c:minorTickMark val="none"/>
         <c:tickLblPos val="nextTo"/>
-        <c:crossAx val="32123904"/>
+        <c:crossAx val="31593600"/>
         <c:crosses val="autoZero"/>
         <c:crossBetween val="midCat"/>
         <c:majorUnit val="1"/>
       </c:valAx>
       <c:valAx>
-        <c:axId val="32123904"/>
+        <c:axId val="31593600"/>
         <c:scaling>
           <c:orientation val="minMax"/>
           <c:max val="110"/>
@@ -6088,7 +6088,7 @@
         <c:majorTickMark val="out"/>
         <c:minorTickMark val="none"/>
         <c:tickLblPos val="nextTo"/>
-        <c:crossAx val="32121984"/>
+        <c:crossAx val="31591424"/>
         <c:crosses val="autoZero"/>
         <c:crossBetween val="midCat"/>
         <c:majorUnit val="5"/>
@@ -6667,11 +6667,11 @@
           <c:showPercent val="0"/>
           <c:showBubbleSize val="0"/>
         </c:dLbls>
-        <c:axId val="32344320"/>
-        <c:axId val="32350592"/>
+        <c:axId val="31936896"/>
+        <c:axId val="31938816"/>
       </c:scatterChart>
       <c:valAx>
-        <c:axId val="32344320"/>
+        <c:axId val="31936896"/>
         <c:scaling>
           <c:orientation val="minMax"/>
           <c:max val="25"/>
@@ -6707,13 +6707,13 @@
         <c:majorTickMark val="out"/>
         <c:minorTickMark val="none"/>
         <c:tickLblPos val="nextTo"/>
-        <c:crossAx val="32350592"/>
+        <c:crossAx val="31938816"/>
         <c:crosses val="autoZero"/>
         <c:crossBetween val="midCat"/>
         <c:majorUnit val="1"/>
       </c:valAx>
       <c:valAx>
-        <c:axId val="32350592"/>
+        <c:axId val="31938816"/>
         <c:scaling>
           <c:orientation val="minMax"/>
           <c:max val="60"/>
@@ -6745,7 +6745,7 @@
         <c:majorTickMark val="out"/>
         <c:minorTickMark val="none"/>
         <c:tickLblPos val="nextTo"/>
-        <c:crossAx val="32344320"/>
+        <c:crossAx val="31936896"/>
         <c:crosses val="autoZero"/>
         <c:crossBetween val="midCat"/>
         <c:majorUnit val="2"/>
@@ -7974,11 +7974,11 @@
           <c:showPercent val="0"/>
           <c:showBubbleSize val="0"/>
         </c:dLbls>
-        <c:axId val="32272384"/>
-        <c:axId val="32274304"/>
+        <c:axId val="31667712"/>
+        <c:axId val="31669632"/>
       </c:scatterChart>
       <c:valAx>
-        <c:axId val="32272384"/>
+        <c:axId val="31667712"/>
         <c:scaling>
           <c:orientation val="minMax"/>
           <c:max val="25"/>
@@ -8009,13 +8009,13 @@
         <c:majorTickMark val="out"/>
         <c:minorTickMark val="none"/>
         <c:tickLblPos val="nextTo"/>
-        <c:crossAx val="32274304"/>
+        <c:crossAx val="31669632"/>
         <c:crosses val="autoZero"/>
         <c:crossBetween val="midCat"/>
         <c:majorUnit val="1"/>
       </c:valAx>
       <c:valAx>
-        <c:axId val="32274304"/>
+        <c:axId val="31669632"/>
         <c:scaling>
           <c:orientation val="minMax"/>
           <c:max val="300"/>
@@ -8052,7 +8052,7 @@
         <c:majorTickMark val="out"/>
         <c:minorTickMark val="none"/>
         <c:tickLblPos val="nextTo"/>
-        <c:crossAx val="32272384"/>
+        <c:crossAx val="31667712"/>
         <c:crosses val="autoZero"/>
         <c:crossBetween val="midCat"/>
         <c:majorUnit val="20"/>
@@ -8631,11 +8631,11 @@
           <c:showPercent val="0"/>
           <c:showBubbleSize val="0"/>
         </c:dLbls>
-        <c:axId val="35344768"/>
-        <c:axId val="35352576"/>
+        <c:axId val="32129408"/>
+        <c:axId val="32131328"/>
       </c:scatterChart>
       <c:valAx>
-        <c:axId val="35344768"/>
+        <c:axId val="32129408"/>
         <c:scaling>
           <c:orientation val="minMax"/>
           <c:max val="25"/>
@@ -8671,13 +8671,13 @@
         <c:majorTickMark val="out"/>
         <c:minorTickMark val="none"/>
         <c:tickLblPos val="nextTo"/>
-        <c:crossAx val="35352576"/>
+        <c:crossAx val="32131328"/>
         <c:crosses val="autoZero"/>
         <c:crossBetween val="midCat"/>
         <c:majorUnit val="1"/>
       </c:valAx>
       <c:valAx>
-        <c:axId val="35352576"/>
+        <c:axId val="32131328"/>
         <c:scaling>
           <c:orientation val="minMax"/>
         </c:scaling>
@@ -8707,7 +8707,7 @@
         <c:majorTickMark val="out"/>
         <c:minorTickMark val="none"/>
         <c:tickLblPos val="nextTo"/>
-        <c:crossAx val="35344768"/>
+        <c:crossAx val="32129408"/>
         <c:crosses val="autoZero"/>
         <c:crossBetween val="midCat"/>
         <c:majorUnit val="5"/>
@@ -9146,11 +9146,11 @@
           <c:showPercent val="0"/>
           <c:showBubbleSize val="0"/>
         </c:dLbls>
-        <c:axId val="35559680"/>
-        <c:axId val="35742080"/>
+        <c:axId val="32203520"/>
+        <c:axId val="32205440"/>
       </c:scatterChart>
       <c:valAx>
-        <c:axId val="35559680"/>
+        <c:axId val="32203520"/>
         <c:scaling>
           <c:orientation val="minMax"/>
           <c:max val="25"/>
@@ -9186,13 +9186,13 @@
         <c:majorTickMark val="out"/>
         <c:minorTickMark val="none"/>
         <c:tickLblPos val="nextTo"/>
-        <c:crossAx val="35742080"/>
+        <c:crossAx val="32205440"/>
         <c:crosses val="autoZero"/>
         <c:crossBetween val="midCat"/>
         <c:majorUnit val="1"/>
       </c:valAx>
       <c:valAx>
-        <c:axId val="35742080"/>
+        <c:axId val="32205440"/>
         <c:scaling>
           <c:orientation val="minMax"/>
           <c:max val="38"/>
@@ -9224,7 +9224,7 @@
         <c:majorTickMark val="out"/>
         <c:minorTickMark val="none"/>
         <c:tickLblPos val="nextTo"/>
-        <c:crossAx val="35559680"/>
+        <c:crossAx val="32203520"/>
         <c:crosses val="autoZero"/>
         <c:crossBetween val="midCat"/>
         <c:majorUnit val="2"/>
@@ -9327,7 +9327,7 @@
           <a:p>
             <a:fld id="{650EE469-00BA-4983-99E8-49201A9B3F3C}" type="datetimeFigureOut">
               <a:rPr lang="en-US" smtClean="0"/>
-              <a:t>1/5/2015</a:t>
+              <a:t>1/6/2015</a:t>
             </a:fld>
             <a:endParaRPr lang="en-US"/>
           </a:p>
@@ -9776,7 +9776,7 @@
           <a:p>
             <a:fld id="{F4E600E6-F117-458E-B0EB-98CE30D69A68}" type="datetimeFigureOut">
               <a:rPr lang="en-US" smtClean="0"/>
-              <a:t>1/5/2015</a:t>
+              <a:t>1/6/2015</a:t>
             </a:fld>
             <a:endParaRPr lang="en-US"/>
           </a:p>
@@ -9946,7 +9946,7 @@
           <a:p>
             <a:fld id="{F4E600E6-F117-458E-B0EB-98CE30D69A68}" type="datetimeFigureOut">
               <a:rPr lang="en-US" smtClean="0"/>
-              <a:t>1/5/2015</a:t>
+              <a:t>1/6/2015</a:t>
             </a:fld>
             <a:endParaRPr lang="en-US"/>
           </a:p>
@@ -10126,7 +10126,7 @@
           <a:p>
             <a:fld id="{F4E600E6-F117-458E-B0EB-98CE30D69A68}" type="datetimeFigureOut">
               <a:rPr lang="en-US" smtClean="0"/>
-              <a:t>1/5/2015</a:t>
+              <a:t>1/6/2015</a:t>
             </a:fld>
             <a:endParaRPr lang="en-US"/>
           </a:p>
@@ -10296,7 +10296,7 @@
           <a:p>
             <a:fld id="{F4E600E6-F117-458E-B0EB-98CE30D69A68}" type="datetimeFigureOut">
               <a:rPr lang="en-US" smtClean="0"/>
-              <a:t>1/5/2015</a:t>
+              <a:t>1/6/2015</a:t>
             </a:fld>
             <a:endParaRPr lang="en-US"/>
           </a:p>
@@ -10542,7 +10542,7 @@
           <a:p>
             <a:fld id="{F4E600E6-F117-458E-B0EB-98CE30D69A68}" type="datetimeFigureOut">
               <a:rPr lang="en-US" smtClean="0"/>
-              <a:t>1/5/2015</a:t>
+              <a:t>1/6/2015</a:t>
             </a:fld>
             <a:endParaRPr lang="en-US"/>
           </a:p>
@@ -10830,7 +10830,7 @@
           <a:p>
             <a:fld id="{F4E600E6-F117-458E-B0EB-98CE30D69A68}" type="datetimeFigureOut">
               <a:rPr lang="en-US" smtClean="0"/>
-              <a:t>1/5/2015</a:t>
+              <a:t>1/6/2015</a:t>
             </a:fld>
             <a:endParaRPr lang="en-US"/>
           </a:p>
@@ -11252,7 +11252,7 @@
           <a:p>
             <a:fld id="{F4E600E6-F117-458E-B0EB-98CE30D69A68}" type="datetimeFigureOut">
               <a:rPr lang="en-US" smtClean="0"/>
-              <a:t>1/5/2015</a:t>
+              <a:t>1/6/2015</a:t>
             </a:fld>
             <a:endParaRPr lang="en-US"/>
           </a:p>
@@ -11370,7 +11370,7 @@
           <a:p>
             <a:fld id="{F4E600E6-F117-458E-B0EB-98CE30D69A68}" type="datetimeFigureOut">
               <a:rPr lang="en-US" smtClean="0"/>
-              <a:t>1/5/2015</a:t>
+              <a:t>1/6/2015</a:t>
             </a:fld>
             <a:endParaRPr lang="en-US"/>
           </a:p>
@@ -11465,7 +11465,7 @@
           <a:p>
             <a:fld id="{F4E600E6-F117-458E-B0EB-98CE30D69A68}" type="datetimeFigureOut">
               <a:rPr lang="en-US" smtClean="0"/>
-              <a:t>1/5/2015</a:t>
+              <a:t>1/6/2015</a:t>
             </a:fld>
             <a:endParaRPr lang="en-US"/>
           </a:p>
@@ -11742,7 +11742,7 @@
           <a:p>
             <a:fld id="{F4E600E6-F117-458E-B0EB-98CE30D69A68}" type="datetimeFigureOut">
               <a:rPr lang="en-US" smtClean="0"/>
-              <a:t>1/5/2015</a:t>
+              <a:t>1/6/2015</a:t>
             </a:fld>
             <a:endParaRPr lang="en-US"/>
           </a:p>
@@ -11995,7 +11995,7 @@
           <a:p>
             <a:fld id="{F4E600E6-F117-458E-B0EB-98CE30D69A68}" type="datetimeFigureOut">
               <a:rPr lang="en-US" smtClean="0"/>
-              <a:t>1/5/2015</a:t>
+              <a:t>1/6/2015</a:t>
             </a:fld>
             <a:endParaRPr lang="en-US"/>
           </a:p>
@@ -12208,7 +12208,7 @@
           <a:p>
             <a:fld id="{F4E600E6-F117-458E-B0EB-98CE30D69A68}" type="datetimeFigureOut">
               <a:rPr lang="en-US" smtClean="0"/>
-              <a:t>1/5/2015</a:t>
+              <a:t>1/6/2015</a:t>
             </a:fld>
             <a:endParaRPr lang="en-US"/>
           </a:p>
@@ -13332,11 +13332,7 @@
           <a:p>
             <a:r>
               <a:rPr lang="en-US" dirty="0" smtClean="0"/>
-              <a:t>Thrust </a:t>
-            </a:r>
-            <a:r>
-              <a:rPr lang="en-US" dirty="0" smtClean="0"/>
-              <a:t>CUDA</a:t>
+              <a:t>Thrust CUDA</a:t>
             </a:r>
             <a:endParaRPr lang="en-US" dirty="0"/>
           </a:p>
@@ -13692,11 +13688,7 @@
           <a:p>
             <a:r>
               <a:rPr lang="en-US" dirty="0" smtClean="0"/>
-              <a:t>Thrust </a:t>
-            </a:r>
-            <a:r>
-              <a:rPr lang="en-US" dirty="0" smtClean="0"/>
-              <a:t>VS VexCL CUDA</a:t>
+              <a:t>Thrust VS VexCL CUDA</a:t>
             </a:r>
             <a:endParaRPr lang="en-US" dirty="0"/>
           </a:p>
@@ -14492,11 +14484,7 @@
             </a:r>
             <a:r>
               <a:rPr lang="en-US" dirty="0" smtClean="0"/>
-              <a:t> </a:t>
-            </a:r>
-            <a:r>
-              <a:rPr lang="en-US" dirty="0" smtClean="0"/>
-              <a:t>Host to Device</a:t>
+              <a:t> Host to Device</a:t>
             </a:r>
             <a:endParaRPr lang="en-US" dirty="0"/>
           </a:p>

</xml_diff>